<commit_message>
Italicized the n,k in images and updated caption in Fig 8
All images have ppt formats.
</commit_message>
<xml_diff>
--- a/pictures/pdf/FrontierNodesVsk.pptx
+++ b/pictures/pdf/FrontierNodesVsk.pptx
@@ -2,12 +2,12 @@
 <file path=ppt/presentation.xml><?xml version="1.0" encoding="utf-8"?>
 <p:presentation xmlns:a="http://schemas.openxmlformats.org/drawingml/2006/main" xmlns:r="http://schemas.openxmlformats.org/officeDocument/2006/relationships" xmlns:p="http://schemas.openxmlformats.org/presentationml/2006/main" saveSubsetFonts="1">
   <p:sldMasterIdLst>
-    <p:sldMasterId id="2147483672" r:id="rId1"/>
+    <p:sldMasterId id="2147483708" r:id="rId1"/>
   </p:sldMasterIdLst>
   <p:sldIdLst>
     <p:sldId id="261" r:id="rId2"/>
   </p:sldIdLst>
-  <p:sldSz cx="12801600" cy="8229600"/>
+  <p:sldSz cx="13258800" cy="8778875"/>
   <p:notesSz cx="6858000" cy="9144000"/>
   <p:defaultTextStyle>
     <a:defPPr>
@@ -141,15 +141,15 @@
         </p:nvSpPr>
         <p:spPr>
           <a:xfrm>
-            <a:off x="1600200" y="1346836"/>
-            <a:ext cx="9601200" cy="2865120"/>
+            <a:off x="994410" y="1436729"/>
+            <a:ext cx="11269980" cy="3056349"/>
           </a:xfrm>
         </p:spPr>
         <p:txBody>
           <a:bodyPr anchor="b"/>
           <a:lstStyle>
             <a:lvl1pPr algn="ctr">
-              <a:defRPr sz="6300"/>
+              <a:defRPr sz="7681"/>
             </a:lvl1pPr>
           </a:lstStyle>
           <a:p>
@@ -173,8 +173,8 @@
         </p:nvSpPr>
         <p:spPr>
           <a:xfrm>
-            <a:off x="1600200" y="4322446"/>
-            <a:ext cx="9601200" cy="1986914"/>
+            <a:off x="1657350" y="4610942"/>
+            <a:ext cx="9944100" cy="2119529"/>
           </a:xfrm>
         </p:spPr>
         <p:txBody>
@@ -182,39 +182,39 @@
           <a:lstStyle>
             <a:lvl1pPr marL="0" indent="0" algn="ctr">
               <a:buNone/>
-              <a:defRPr sz="2520"/>
+              <a:defRPr sz="3072"/>
             </a:lvl1pPr>
-            <a:lvl2pPr marL="480060" indent="0" algn="ctr">
-              <a:buNone/>
-              <a:defRPr sz="2100"/>
+            <a:lvl2pPr marL="585262" indent="0" algn="ctr">
+              <a:buNone/>
+              <a:defRPr sz="2560"/>
             </a:lvl2pPr>
-            <a:lvl3pPr marL="960120" indent="0" algn="ctr">
-              <a:buNone/>
-              <a:defRPr sz="1890"/>
+            <a:lvl3pPr marL="1170523" indent="0" algn="ctr">
+              <a:buNone/>
+              <a:defRPr sz="2304"/>
             </a:lvl3pPr>
-            <a:lvl4pPr marL="1440180" indent="0" algn="ctr">
-              <a:buNone/>
-              <a:defRPr sz="1680"/>
+            <a:lvl4pPr marL="1755785" indent="0" algn="ctr">
+              <a:buNone/>
+              <a:defRPr sz="2048"/>
             </a:lvl4pPr>
-            <a:lvl5pPr marL="1920240" indent="0" algn="ctr">
-              <a:buNone/>
-              <a:defRPr sz="1680"/>
+            <a:lvl5pPr marL="2341047" indent="0" algn="ctr">
+              <a:buNone/>
+              <a:defRPr sz="2048"/>
             </a:lvl5pPr>
-            <a:lvl6pPr marL="2400300" indent="0" algn="ctr">
-              <a:buNone/>
-              <a:defRPr sz="1680"/>
+            <a:lvl6pPr marL="2926309" indent="0" algn="ctr">
+              <a:buNone/>
+              <a:defRPr sz="2048"/>
             </a:lvl6pPr>
-            <a:lvl7pPr marL="2880360" indent="0" algn="ctr">
-              <a:buNone/>
-              <a:defRPr sz="1680"/>
+            <a:lvl7pPr marL="3511570" indent="0" algn="ctr">
+              <a:buNone/>
+              <a:defRPr sz="2048"/>
             </a:lvl7pPr>
-            <a:lvl8pPr marL="3360420" indent="0" algn="ctr">
-              <a:buNone/>
-              <a:defRPr sz="1680"/>
+            <a:lvl8pPr marL="4096832" indent="0" algn="ctr">
+              <a:buNone/>
+              <a:defRPr sz="2048"/>
             </a:lvl8pPr>
-            <a:lvl9pPr marL="3840480" indent="0" algn="ctr">
-              <a:buNone/>
-              <a:defRPr sz="1680"/>
+            <a:lvl9pPr marL="4682094" indent="0" algn="ctr">
+              <a:buNone/>
+              <a:defRPr sz="2048"/>
             </a:lvl9pPr>
           </a:lstStyle>
           <a:p>
@@ -243,7 +243,7 @@
           <a:p>
             <a:fld id="{128B2BB6-DE7B-44D1-BBCC-4DE62C6920C0}" type="datetimeFigureOut">
               <a:rPr lang="en-US" smtClean="0"/>
-              <a:t>2/20/2017</a:t>
+              <a:t>2/28/2017</a:t>
             </a:fld>
             <a:endParaRPr lang="en-US"/>
           </a:p>
@@ -294,7 +294,7 @@
     </p:spTree>
     <p:extLst>
       <p:ext uri="{BB962C8B-B14F-4D97-AF65-F5344CB8AC3E}">
-        <p14:creationId xmlns:p14="http://schemas.microsoft.com/office/powerpoint/2010/main" val="2494913867"/>
+        <p14:creationId xmlns:p14="http://schemas.microsoft.com/office/powerpoint/2010/main" val="1537630103"/>
       </p:ext>
     </p:extLst>
   </p:cSld>
@@ -413,7 +413,7 @@
           <a:p>
             <a:fld id="{128B2BB6-DE7B-44D1-BBCC-4DE62C6920C0}" type="datetimeFigureOut">
               <a:rPr lang="en-US" smtClean="0"/>
-              <a:t>2/20/2017</a:t>
+              <a:t>2/28/2017</a:t>
             </a:fld>
             <a:endParaRPr lang="en-US"/>
           </a:p>
@@ -464,7 +464,7 @@
     </p:spTree>
     <p:extLst>
       <p:ext uri="{BB962C8B-B14F-4D97-AF65-F5344CB8AC3E}">
-        <p14:creationId xmlns:p14="http://schemas.microsoft.com/office/powerpoint/2010/main" val="2329900386"/>
+        <p14:creationId xmlns:p14="http://schemas.microsoft.com/office/powerpoint/2010/main" val="438309432"/>
       </p:ext>
     </p:extLst>
   </p:cSld>
@@ -503,8 +503,8 @@
         </p:nvSpPr>
         <p:spPr>
           <a:xfrm>
-            <a:off x="9161145" y="438150"/>
-            <a:ext cx="2760345" cy="6974206"/>
+            <a:off x="9488329" y="467394"/>
+            <a:ext cx="2858929" cy="7439691"/>
           </a:xfrm>
         </p:spPr>
         <p:txBody>
@@ -531,8 +531,8 @@
         </p:nvSpPr>
         <p:spPr>
           <a:xfrm>
-            <a:off x="880110" y="438150"/>
-            <a:ext cx="8121015" cy="6974206"/>
+            <a:off x="911543" y="467394"/>
+            <a:ext cx="8411051" cy="7439691"/>
           </a:xfrm>
         </p:spPr>
         <p:txBody>
@@ -593,7 +593,7 @@
           <a:p>
             <a:fld id="{128B2BB6-DE7B-44D1-BBCC-4DE62C6920C0}" type="datetimeFigureOut">
               <a:rPr lang="en-US" smtClean="0"/>
-              <a:t>2/20/2017</a:t>
+              <a:t>2/28/2017</a:t>
             </a:fld>
             <a:endParaRPr lang="en-US"/>
           </a:p>
@@ -644,7 +644,7 @@
     </p:spTree>
     <p:extLst>
       <p:ext uri="{BB962C8B-B14F-4D97-AF65-F5344CB8AC3E}">
-        <p14:creationId xmlns:p14="http://schemas.microsoft.com/office/powerpoint/2010/main" val="3555575899"/>
+        <p14:creationId xmlns:p14="http://schemas.microsoft.com/office/powerpoint/2010/main" val="3247622191"/>
       </p:ext>
     </p:extLst>
   </p:cSld>
@@ -763,7 +763,7 @@
           <a:p>
             <a:fld id="{128B2BB6-DE7B-44D1-BBCC-4DE62C6920C0}" type="datetimeFigureOut">
               <a:rPr lang="en-US" smtClean="0"/>
-              <a:t>2/20/2017</a:t>
+              <a:t>2/28/2017</a:t>
             </a:fld>
             <a:endParaRPr lang="en-US"/>
           </a:p>
@@ -814,7 +814,7 @@
     </p:spTree>
     <p:extLst>
       <p:ext uri="{BB962C8B-B14F-4D97-AF65-F5344CB8AC3E}">
-        <p14:creationId xmlns:p14="http://schemas.microsoft.com/office/powerpoint/2010/main" val="255081198"/>
+        <p14:creationId xmlns:p14="http://schemas.microsoft.com/office/powerpoint/2010/main" val="518861569"/>
       </p:ext>
     </p:extLst>
   </p:cSld>
@@ -853,15 +853,15 @@
         </p:nvSpPr>
         <p:spPr>
           <a:xfrm>
-            <a:off x="873443" y="2051686"/>
-            <a:ext cx="11041380" cy="3423284"/>
+            <a:off x="904638" y="2188625"/>
+            <a:ext cx="11435715" cy="3651768"/>
           </a:xfrm>
         </p:spPr>
         <p:txBody>
           <a:bodyPr anchor="b"/>
           <a:lstStyle>
             <a:lvl1pPr>
-              <a:defRPr sz="6300"/>
+              <a:defRPr sz="7681"/>
             </a:lvl1pPr>
           </a:lstStyle>
           <a:p>
@@ -885,8 +885,8 @@
         </p:nvSpPr>
         <p:spPr>
           <a:xfrm>
-            <a:off x="873443" y="5507356"/>
-            <a:ext cx="11041380" cy="1800224"/>
+            <a:off x="904638" y="5874940"/>
+            <a:ext cx="11435715" cy="1920378"/>
           </a:xfrm>
         </p:spPr>
         <p:txBody>
@@ -894,17 +894,15 @@
           <a:lstStyle>
             <a:lvl1pPr marL="0" indent="0">
               <a:buNone/>
-              <a:defRPr sz="2520">
+              <a:defRPr sz="3072">
                 <a:solidFill>
-                  <a:schemeClr val="tx1">
-                    <a:tint val="75000"/>
-                  </a:schemeClr>
+                  <a:schemeClr val="tx1"/>
                 </a:solidFill>
               </a:defRPr>
             </a:lvl1pPr>
-            <a:lvl2pPr marL="480060" indent="0">
-              <a:buNone/>
-              <a:defRPr sz="2100">
+            <a:lvl2pPr marL="585262" indent="0">
+              <a:buNone/>
+              <a:defRPr sz="2560">
                 <a:solidFill>
                   <a:schemeClr val="tx1">
                     <a:tint val="75000"/>
@@ -912,9 +910,9 @@
                 </a:solidFill>
               </a:defRPr>
             </a:lvl2pPr>
-            <a:lvl3pPr marL="960120" indent="0">
-              <a:buNone/>
-              <a:defRPr sz="1890">
+            <a:lvl3pPr marL="1170523" indent="0">
+              <a:buNone/>
+              <a:defRPr sz="2304">
                 <a:solidFill>
                   <a:schemeClr val="tx1">
                     <a:tint val="75000"/>
@@ -922,9 +920,9 @@
                 </a:solidFill>
               </a:defRPr>
             </a:lvl3pPr>
-            <a:lvl4pPr marL="1440180" indent="0">
-              <a:buNone/>
-              <a:defRPr sz="1680">
+            <a:lvl4pPr marL="1755785" indent="0">
+              <a:buNone/>
+              <a:defRPr sz="2048">
                 <a:solidFill>
                   <a:schemeClr val="tx1">
                     <a:tint val="75000"/>
@@ -932,9 +930,9 @@
                 </a:solidFill>
               </a:defRPr>
             </a:lvl4pPr>
-            <a:lvl5pPr marL="1920240" indent="0">
-              <a:buNone/>
-              <a:defRPr sz="1680">
+            <a:lvl5pPr marL="2341047" indent="0">
+              <a:buNone/>
+              <a:defRPr sz="2048">
                 <a:solidFill>
                   <a:schemeClr val="tx1">
                     <a:tint val="75000"/>
@@ -942,9 +940,9 @@
                 </a:solidFill>
               </a:defRPr>
             </a:lvl5pPr>
-            <a:lvl6pPr marL="2400300" indent="0">
-              <a:buNone/>
-              <a:defRPr sz="1680">
+            <a:lvl6pPr marL="2926309" indent="0">
+              <a:buNone/>
+              <a:defRPr sz="2048">
                 <a:solidFill>
                   <a:schemeClr val="tx1">
                     <a:tint val="75000"/>
@@ -952,9 +950,9 @@
                 </a:solidFill>
               </a:defRPr>
             </a:lvl6pPr>
-            <a:lvl7pPr marL="2880360" indent="0">
-              <a:buNone/>
-              <a:defRPr sz="1680">
+            <a:lvl7pPr marL="3511570" indent="0">
+              <a:buNone/>
+              <a:defRPr sz="2048">
                 <a:solidFill>
                   <a:schemeClr val="tx1">
                     <a:tint val="75000"/>
@@ -962,9 +960,9 @@
                 </a:solidFill>
               </a:defRPr>
             </a:lvl7pPr>
-            <a:lvl8pPr marL="3360420" indent="0">
-              <a:buNone/>
-              <a:defRPr sz="1680">
+            <a:lvl8pPr marL="4096832" indent="0">
+              <a:buNone/>
+              <a:defRPr sz="2048">
                 <a:solidFill>
                   <a:schemeClr val="tx1">
                     <a:tint val="75000"/>
@@ -972,9 +970,9 @@
                 </a:solidFill>
               </a:defRPr>
             </a:lvl8pPr>
-            <a:lvl9pPr marL="3840480" indent="0">
-              <a:buNone/>
-              <a:defRPr sz="1680">
+            <a:lvl9pPr marL="4682094" indent="0">
+              <a:buNone/>
+              <a:defRPr sz="2048">
                 <a:solidFill>
                   <a:schemeClr val="tx1">
                     <a:tint val="75000"/>
@@ -1009,7 +1007,7 @@
           <a:p>
             <a:fld id="{128B2BB6-DE7B-44D1-BBCC-4DE62C6920C0}" type="datetimeFigureOut">
               <a:rPr lang="en-US" smtClean="0"/>
-              <a:t>2/20/2017</a:t>
+              <a:t>2/28/2017</a:t>
             </a:fld>
             <a:endParaRPr lang="en-US"/>
           </a:p>
@@ -1060,7 +1058,7 @@
     </p:spTree>
     <p:extLst>
       <p:ext uri="{BB962C8B-B14F-4D97-AF65-F5344CB8AC3E}">
-        <p14:creationId xmlns:p14="http://schemas.microsoft.com/office/powerpoint/2010/main" val="3591007962"/>
+        <p14:creationId xmlns:p14="http://schemas.microsoft.com/office/powerpoint/2010/main" val="4161220910"/>
       </p:ext>
     </p:extLst>
   </p:cSld>
@@ -1122,8 +1120,8 @@
         </p:nvSpPr>
         <p:spPr>
           <a:xfrm>
-            <a:off x="880110" y="2190750"/>
-            <a:ext cx="5440680" cy="5221606"/>
+            <a:off x="911543" y="2336969"/>
+            <a:ext cx="5634990" cy="5570116"/>
           </a:xfrm>
         </p:spPr>
         <p:txBody>
@@ -1179,8 +1177,8 @@
         </p:nvSpPr>
         <p:spPr>
           <a:xfrm>
-            <a:off x="6480810" y="2190750"/>
-            <a:ext cx="5440680" cy="5221606"/>
+            <a:off x="6712268" y="2336969"/>
+            <a:ext cx="5634990" cy="5570116"/>
           </a:xfrm>
         </p:spPr>
         <p:txBody>
@@ -1241,7 +1239,7 @@
           <a:p>
             <a:fld id="{128B2BB6-DE7B-44D1-BBCC-4DE62C6920C0}" type="datetimeFigureOut">
               <a:rPr lang="en-US" smtClean="0"/>
-              <a:t>2/20/2017</a:t>
+              <a:t>2/28/2017</a:t>
             </a:fld>
             <a:endParaRPr lang="en-US"/>
           </a:p>
@@ -1292,7 +1290,7 @@
     </p:spTree>
     <p:extLst>
       <p:ext uri="{BB962C8B-B14F-4D97-AF65-F5344CB8AC3E}">
-        <p14:creationId xmlns:p14="http://schemas.microsoft.com/office/powerpoint/2010/main" val="987591649"/>
+        <p14:creationId xmlns:p14="http://schemas.microsoft.com/office/powerpoint/2010/main" val="3083012601"/>
       </p:ext>
     </p:extLst>
   </p:cSld>
@@ -1331,8 +1329,8 @@
         </p:nvSpPr>
         <p:spPr>
           <a:xfrm>
-            <a:off x="881777" y="438150"/>
-            <a:ext cx="11041380" cy="1590676"/>
+            <a:off x="913269" y="467396"/>
+            <a:ext cx="11435715" cy="1696843"/>
           </a:xfrm>
         </p:spPr>
         <p:txBody>
@@ -1359,8 +1357,8 @@
         </p:nvSpPr>
         <p:spPr>
           <a:xfrm>
-            <a:off x="881778" y="2017396"/>
-            <a:ext cx="5415676" cy="988694"/>
+            <a:off x="913271" y="2152044"/>
+            <a:ext cx="5609093" cy="1054684"/>
           </a:xfrm>
         </p:spPr>
         <p:txBody>
@@ -1368,39 +1366,39 @@
           <a:lstStyle>
             <a:lvl1pPr marL="0" indent="0">
               <a:buNone/>
-              <a:defRPr sz="2520" b="1"/>
+              <a:defRPr sz="3072" b="1"/>
             </a:lvl1pPr>
-            <a:lvl2pPr marL="480060" indent="0">
-              <a:buNone/>
-              <a:defRPr sz="2100" b="1"/>
+            <a:lvl2pPr marL="585262" indent="0">
+              <a:buNone/>
+              <a:defRPr sz="2560" b="1"/>
             </a:lvl2pPr>
-            <a:lvl3pPr marL="960120" indent="0">
-              <a:buNone/>
-              <a:defRPr sz="1890" b="1"/>
+            <a:lvl3pPr marL="1170523" indent="0">
+              <a:buNone/>
+              <a:defRPr sz="2304" b="1"/>
             </a:lvl3pPr>
-            <a:lvl4pPr marL="1440180" indent="0">
-              <a:buNone/>
-              <a:defRPr sz="1680" b="1"/>
+            <a:lvl4pPr marL="1755785" indent="0">
+              <a:buNone/>
+              <a:defRPr sz="2048" b="1"/>
             </a:lvl4pPr>
-            <a:lvl5pPr marL="1920240" indent="0">
-              <a:buNone/>
-              <a:defRPr sz="1680" b="1"/>
+            <a:lvl5pPr marL="2341047" indent="0">
+              <a:buNone/>
+              <a:defRPr sz="2048" b="1"/>
             </a:lvl5pPr>
-            <a:lvl6pPr marL="2400300" indent="0">
-              <a:buNone/>
-              <a:defRPr sz="1680" b="1"/>
+            <a:lvl6pPr marL="2926309" indent="0">
+              <a:buNone/>
+              <a:defRPr sz="2048" b="1"/>
             </a:lvl6pPr>
-            <a:lvl7pPr marL="2880360" indent="0">
-              <a:buNone/>
-              <a:defRPr sz="1680" b="1"/>
+            <a:lvl7pPr marL="3511570" indent="0">
+              <a:buNone/>
+              <a:defRPr sz="2048" b="1"/>
             </a:lvl7pPr>
-            <a:lvl8pPr marL="3360420" indent="0">
-              <a:buNone/>
-              <a:defRPr sz="1680" b="1"/>
+            <a:lvl8pPr marL="4096832" indent="0">
+              <a:buNone/>
+              <a:defRPr sz="2048" b="1"/>
             </a:lvl8pPr>
-            <a:lvl9pPr marL="3840480" indent="0">
-              <a:buNone/>
-              <a:defRPr sz="1680" b="1"/>
+            <a:lvl9pPr marL="4682094" indent="0">
+              <a:buNone/>
+              <a:defRPr sz="2048" b="1"/>
             </a:lvl9pPr>
           </a:lstStyle>
           <a:p>
@@ -1424,8 +1422,8 @@
         </p:nvSpPr>
         <p:spPr>
           <a:xfrm>
-            <a:off x="881778" y="3006090"/>
-            <a:ext cx="5415676" cy="4421506"/>
+            <a:off x="913271" y="3206728"/>
+            <a:ext cx="5609093" cy="4716614"/>
           </a:xfrm>
         </p:spPr>
         <p:txBody>
@@ -1481,8 +1479,8 @@
         </p:nvSpPr>
         <p:spPr>
           <a:xfrm>
-            <a:off x="6480810" y="2017396"/>
-            <a:ext cx="5442347" cy="988694"/>
+            <a:off x="6712268" y="2152044"/>
+            <a:ext cx="5636717" cy="1054684"/>
           </a:xfrm>
         </p:spPr>
         <p:txBody>
@@ -1490,39 +1488,39 @@
           <a:lstStyle>
             <a:lvl1pPr marL="0" indent="0">
               <a:buNone/>
-              <a:defRPr sz="2520" b="1"/>
+              <a:defRPr sz="3072" b="1"/>
             </a:lvl1pPr>
-            <a:lvl2pPr marL="480060" indent="0">
-              <a:buNone/>
-              <a:defRPr sz="2100" b="1"/>
+            <a:lvl2pPr marL="585262" indent="0">
+              <a:buNone/>
+              <a:defRPr sz="2560" b="1"/>
             </a:lvl2pPr>
-            <a:lvl3pPr marL="960120" indent="0">
-              <a:buNone/>
-              <a:defRPr sz="1890" b="1"/>
+            <a:lvl3pPr marL="1170523" indent="0">
+              <a:buNone/>
+              <a:defRPr sz="2304" b="1"/>
             </a:lvl3pPr>
-            <a:lvl4pPr marL="1440180" indent="0">
-              <a:buNone/>
-              <a:defRPr sz="1680" b="1"/>
+            <a:lvl4pPr marL="1755785" indent="0">
+              <a:buNone/>
+              <a:defRPr sz="2048" b="1"/>
             </a:lvl4pPr>
-            <a:lvl5pPr marL="1920240" indent="0">
-              <a:buNone/>
-              <a:defRPr sz="1680" b="1"/>
+            <a:lvl5pPr marL="2341047" indent="0">
+              <a:buNone/>
+              <a:defRPr sz="2048" b="1"/>
             </a:lvl5pPr>
-            <a:lvl6pPr marL="2400300" indent="0">
-              <a:buNone/>
-              <a:defRPr sz="1680" b="1"/>
+            <a:lvl6pPr marL="2926309" indent="0">
+              <a:buNone/>
+              <a:defRPr sz="2048" b="1"/>
             </a:lvl6pPr>
-            <a:lvl7pPr marL="2880360" indent="0">
-              <a:buNone/>
-              <a:defRPr sz="1680" b="1"/>
+            <a:lvl7pPr marL="3511570" indent="0">
+              <a:buNone/>
+              <a:defRPr sz="2048" b="1"/>
             </a:lvl7pPr>
-            <a:lvl8pPr marL="3360420" indent="0">
-              <a:buNone/>
-              <a:defRPr sz="1680" b="1"/>
+            <a:lvl8pPr marL="4096832" indent="0">
+              <a:buNone/>
+              <a:defRPr sz="2048" b="1"/>
             </a:lvl8pPr>
-            <a:lvl9pPr marL="3840480" indent="0">
-              <a:buNone/>
-              <a:defRPr sz="1680" b="1"/>
+            <a:lvl9pPr marL="4682094" indent="0">
+              <a:buNone/>
+              <a:defRPr sz="2048" b="1"/>
             </a:lvl9pPr>
           </a:lstStyle>
           <a:p>
@@ -1546,8 +1544,8 @@
         </p:nvSpPr>
         <p:spPr>
           <a:xfrm>
-            <a:off x="6480810" y="3006090"/>
-            <a:ext cx="5442347" cy="4421506"/>
+            <a:off x="6712268" y="3206728"/>
+            <a:ext cx="5636717" cy="4716614"/>
           </a:xfrm>
         </p:spPr>
         <p:txBody>
@@ -1608,7 +1606,7 @@
           <a:p>
             <a:fld id="{128B2BB6-DE7B-44D1-BBCC-4DE62C6920C0}" type="datetimeFigureOut">
               <a:rPr lang="en-US" smtClean="0"/>
-              <a:t>2/20/2017</a:t>
+              <a:t>2/28/2017</a:t>
             </a:fld>
             <a:endParaRPr lang="en-US"/>
           </a:p>
@@ -1659,7 +1657,7 @@
     </p:spTree>
     <p:extLst>
       <p:ext uri="{BB962C8B-B14F-4D97-AF65-F5344CB8AC3E}">
-        <p14:creationId xmlns:p14="http://schemas.microsoft.com/office/powerpoint/2010/main" val="15055993"/>
+        <p14:creationId xmlns:p14="http://schemas.microsoft.com/office/powerpoint/2010/main" val="3819769999"/>
       </p:ext>
     </p:extLst>
   </p:cSld>
@@ -1726,7 +1724,7 @@
           <a:p>
             <a:fld id="{128B2BB6-DE7B-44D1-BBCC-4DE62C6920C0}" type="datetimeFigureOut">
               <a:rPr lang="en-US" smtClean="0"/>
-              <a:t>2/20/2017</a:t>
+              <a:t>2/28/2017</a:t>
             </a:fld>
             <a:endParaRPr lang="en-US"/>
           </a:p>
@@ -1777,7 +1775,7 @@
     </p:spTree>
     <p:extLst>
       <p:ext uri="{BB962C8B-B14F-4D97-AF65-F5344CB8AC3E}">
-        <p14:creationId xmlns:p14="http://schemas.microsoft.com/office/powerpoint/2010/main" val="347620871"/>
+        <p14:creationId xmlns:p14="http://schemas.microsoft.com/office/powerpoint/2010/main" val="2497055915"/>
       </p:ext>
     </p:extLst>
   </p:cSld>
@@ -1821,7 +1819,7 @@
           <a:p>
             <a:fld id="{128B2BB6-DE7B-44D1-BBCC-4DE62C6920C0}" type="datetimeFigureOut">
               <a:rPr lang="en-US" smtClean="0"/>
-              <a:t>2/20/2017</a:t>
+              <a:t>2/28/2017</a:t>
             </a:fld>
             <a:endParaRPr lang="en-US"/>
           </a:p>
@@ -1872,7 +1870,7 @@
     </p:spTree>
     <p:extLst>
       <p:ext uri="{BB962C8B-B14F-4D97-AF65-F5344CB8AC3E}">
-        <p14:creationId xmlns:p14="http://schemas.microsoft.com/office/powerpoint/2010/main" val="1697536215"/>
+        <p14:creationId xmlns:p14="http://schemas.microsoft.com/office/powerpoint/2010/main" val="2104860184"/>
       </p:ext>
     </p:extLst>
   </p:cSld>
@@ -1911,15 +1909,15 @@
         </p:nvSpPr>
         <p:spPr>
           <a:xfrm>
-            <a:off x="881778" y="548640"/>
-            <a:ext cx="4128849" cy="1920240"/>
+            <a:off x="913270" y="585258"/>
+            <a:ext cx="4276308" cy="2048404"/>
           </a:xfrm>
         </p:spPr>
         <p:txBody>
           <a:bodyPr anchor="b"/>
           <a:lstStyle>
             <a:lvl1pPr>
-              <a:defRPr sz="3360"/>
+              <a:defRPr sz="4096"/>
             </a:lvl1pPr>
           </a:lstStyle>
           <a:p>
@@ -1943,39 +1941,39 @@
         </p:nvSpPr>
         <p:spPr>
           <a:xfrm>
-            <a:off x="5442347" y="1184911"/>
-            <a:ext cx="6480810" cy="5848350"/>
+            <a:off x="5636717" y="1263997"/>
+            <a:ext cx="6712268" cy="6238691"/>
           </a:xfrm>
         </p:spPr>
         <p:txBody>
           <a:bodyPr/>
           <a:lstStyle>
             <a:lvl1pPr>
-              <a:defRPr sz="3360"/>
+              <a:defRPr sz="4096"/>
             </a:lvl1pPr>
             <a:lvl2pPr>
-              <a:defRPr sz="2940"/>
+              <a:defRPr sz="3584"/>
             </a:lvl2pPr>
             <a:lvl3pPr>
-              <a:defRPr sz="2520"/>
+              <a:defRPr sz="3072"/>
             </a:lvl3pPr>
             <a:lvl4pPr>
-              <a:defRPr sz="2100"/>
+              <a:defRPr sz="2560"/>
             </a:lvl4pPr>
             <a:lvl5pPr>
-              <a:defRPr sz="2100"/>
+              <a:defRPr sz="2560"/>
             </a:lvl5pPr>
             <a:lvl6pPr>
-              <a:defRPr sz="2100"/>
+              <a:defRPr sz="2560"/>
             </a:lvl6pPr>
             <a:lvl7pPr>
-              <a:defRPr sz="2100"/>
+              <a:defRPr sz="2560"/>
             </a:lvl7pPr>
             <a:lvl8pPr>
-              <a:defRPr sz="2100"/>
+              <a:defRPr sz="2560"/>
             </a:lvl8pPr>
             <a:lvl9pPr>
-              <a:defRPr sz="2100"/>
+              <a:defRPr sz="2560"/>
             </a:lvl9pPr>
           </a:lstStyle>
           <a:p>
@@ -2028,8 +2026,8 @@
         </p:nvSpPr>
         <p:spPr>
           <a:xfrm>
-            <a:off x="881778" y="2468880"/>
-            <a:ext cx="4128849" cy="4573906"/>
+            <a:off x="913270" y="2633662"/>
+            <a:ext cx="4276308" cy="4879186"/>
           </a:xfrm>
         </p:spPr>
         <p:txBody>
@@ -2037,39 +2035,39 @@
           <a:lstStyle>
             <a:lvl1pPr marL="0" indent="0">
               <a:buNone/>
-              <a:defRPr sz="1680"/>
+              <a:defRPr sz="2048"/>
             </a:lvl1pPr>
-            <a:lvl2pPr marL="480060" indent="0">
-              <a:buNone/>
-              <a:defRPr sz="1470"/>
+            <a:lvl2pPr marL="585262" indent="0">
+              <a:buNone/>
+              <a:defRPr sz="1792"/>
             </a:lvl2pPr>
-            <a:lvl3pPr marL="960120" indent="0">
-              <a:buNone/>
-              <a:defRPr sz="1260"/>
+            <a:lvl3pPr marL="1170523" indent="0">
+              <a:buNone/>
+              <a:defRPr sz="1536"/>
             </a:lvl3pPr>
-            <a:lvl4pPr marL="1440180" indent="0">
-              <a:buNone/>
-              <a:defRPr sz="1050"/>
+            <a:lvl4pPr marL="1755785" indent="0">
+              <a:buNone/>
+              <a:defRPr sz="1280"/>
             </a:lvl4pPr>
-            <a:lvl5pPr marL="1920240" indent="0">
-              <a:buNone/>
-              <a:defRPr sz="1050"/>
+            <a:lvl5pPr marL="2341047" indent="0">
+              <a:buNone/>
+              <a:defRPr sz="1280"/>
             </a:lvl5pPr>
-            <a:lvl6pPr marL="2400300" indent="0">
-              <a:buNone/>
-              <a:defRPr sz="1050"/>
+            <a:lvl6pPr marL="2926309" indent="0">
+              <a:buNone/>
+              <a:defRPr sz="1280"/>
             </a:lvl6pPr>
-            <a:lvl7pPr marL="2880360" indent="0">
-              <a:buNone/>
-              <a:defRPr sz="1050"/>
+            <a:lvl7pPr marL="3511570" indent="0">
+              <a:buNone/>
+              <a:defRPr sz="1280"/>
             </a:lvl7pPr>
-            <a:lvl8pPr marL="3360420" indent="0">
-              <a:buNone/>
-              <a:defRPr sz="1050"/>
+            <a:lvl8pPr marL="4096832" indent="0">
+              <a:buNone/>
+              <a:defRPr sz="1280"/>
             </a:lvl8pPr>
-            <a:lvl9pPr marL="3840480" indent="0">
-              <a:buNone/>
-              <a:defRPr sz="1050"/>
+            <a:lvl9pPr marL="4682094" indent="0">
+              <a:buNone/>
+              <a:defRPr sz="1280"/>
             </a:lvl9pPr>
           </a:lstStyle>
           <a:p>
@@ -2098,7 +2096,7 @@
           <a:p>
             <a:fld id="{128B2BB6-DE7B-44D1-BBCC-4DE62C6920C0}" type="datetimeFigureOut">
               <a:rPr lang="en-US" smtClean="0"/>
-              <a:t>2/20/2017</a:t>
+              <a:t>2/28/2017</a:t>
             </a:fld>
             <a:endParaRPr lang="en-US"/>
           </a:p>
@@ -2149,7 +2147,7 @@
     </p:spTree>
     <p:extLst>
       <p:ext uri="{BB962C8B-B14F-4D97-AF65-F5344CB8AC3E}">
-        <p14:creationId xmlns:p14="http://schemas.microsoft.com/office/powerpoint/2010/main" val="2874142189"/>
+        <p14:creationId xmlns:p14="http://schemas.microsoft.com/office/powerpoint/2010/main" val="354879917"/>
       </p:ext>
     </p:extLst>
   </p:cSld>
@@ -2188,15 +2186,15 @@
         </p:nvSpPr>
         <p:spPr>
           <a:xfrm>
-            <a:off x="881778" y="548640"/>
-            <a:ext cx="4128849" cy="1920240"/>
+            <a:off x="913270" y="585258"/>
+            <a:ext cx="4276308" cy="2048404"/>
           </a:xfrm>
         </p:spPr>
         <p:txBody>
           <a:bodyPr anchor="b"/>
           <a:lstStyle>
             <a:lvl1pPr>
-              <a:defRPr sz="3360"/>
+              <a:defRPr sz="4096"/>
             </a:lvl1pPr>
           </a:lstStyle>
           <a:p>
@@ -2220,8 +2218,8 @@
         </p:nvSpPr>
         <p:spPr>
           <a:xfrm>
-            <a:off x="5442347" y="1184911"/>
-            <a:ext cx="6480810" cy="5848350"/>
+            <a:off x="5636717" y="1263997"/>
+            <a:ext cx="6712268" cy="6238691"/>
           </a:xfrm>
         </p:spPr>
         <p:txBody>
@@ -2229,39 +2227,39 @@
           <a:lstStyle>
             <a:lvl1pPr marL="0" indent="0">
               <a:buNone/>
-              <a:defRPr sz="3360"/>
+              <a:defRPr sz="4096"/>
             </a:lvl1pPr>
-            <a:lvl2pPr marL="480060" indent="0">
-              <a:buNone/>
-              <a:defRPr sz="2940"/>
+            <a:lvl2pPr marL="585262" indent="0">
+              <a:buNone/>
+              <a:defRPr sz="3584"/>
             </a:lvl2pPr>
-            <a:lvl3pPr marL="960120" indent="0">
-              <a:buNone/>
-              <a:defRPr sz="2520"/>
+            <a:lvl3pPr marL="1170523" indent="0">
+              <a:buNone/>
+              <a:defRPr sz="3072"/>
             </a:lvl3pPr>
-            <a:lvl4pPr marL="1440180" indent="0">
-              <a:buNone/>
-              <a:defRPr sz="2100"/>
+            <a:lvl4pPr marL="1755785" indent="0">
+              <a:buNone/>
+              <a:defRPr sz="2560"/>
             </a:lvl4pPr>
-            <a:lvl5pPr marL="1920240" indent="0">
-              <a:buNone/>
-              <a:defRPr sz="2100"/>
+            <a:lvl5pPr marL="2341047" indent="0">
+              <a:buNone/>
+              <a:defRPr sz="2560"/>
             </a:lvl5pPr>
-            <a:lvl6pPr marL="2400300" indent="0">
-              <a:buNone/>
-              <a:defRPr sz="2100"/>
+            <a:lvl6pPr marL="2926309" indent="0">
+              <a:buNone/>
+              <a:defRPr sz="2560"/>
             </a:lvl6pPr>
-            <a:lvl7pPr marL="2880360" indent="0">
-              <a:buNone/>
-              <a:defRPr sz="2100"/>
+            <a:lvl7pPr marL="3511570" indent="0">
+              <a:buNone/>
+              <a:defRPr sz="2560"/>
             </a:lvl7pPr>
-            <a:lvl8pPr marL="3360420" indent="0">
-              <a:buNone/>
-              <a:defRPr sz="2100"/>
+            <a:lvl8pPr marL="4096832" indent="0">
+              <a:buNone/>
+              <a:defRPr sz="2560"/>
             </a:lvl8pPr>
-            <a:lvl9pPr marL="3840480" indent="0">
-              <a:buNone/>
-              <a:defRPr sz="2100"/>
+            <a:lvl9pPr marL="4682094" indent="0">
+              <a:buNone/>
+              <a:defRPr sz="2560"/>
             </a:lvl9pPr>
           </a:lstStyle>
           <a:p>
@@ -2285,8 +2283,8 @@
         </p:nvSpPr>
         <p:spPr>
           <a:xfrm>
-            <a:off x="881778" y="2468880"/>
-            <a:ext cx="4128849" cy="4573906"/>
+            <a:off x="913270" y="2633662"/>
+            <a:ext cx="4276308" cy="4879186"/>
           </a:xfrm>
         </p:spPr>
         <p:txBody>
@@ -2294,39 +2292,39 @@
           <a:lstStyle>
             <a:lvl1pPr marL="0" indent="0">
               <a:buNone/>
-              <a:defRPr sz="1680"/>
+              <a:defRPr sz="2048"/>
             </a:lvl1pPr>
-            <a:lvl2pPr marL="480060" indent="0">
-              <a:buNone/>
-              <a:defRPr sz="1470"/>
+            <a:lvl2pPr marL="585262" indent="0">
+              <a:buNone/>
+              <a:defRPr sz="1792"/>
             </a:lvl2pPr>
-            <a:lvl3pPr marL="960120" indent="0">
-              <a:buNone/>
-              <a:defRPr sz="1260"/>
+            <a:lvl3pPr marL="1170523" indent="0">
+              <a:buNone/>
+              <a:defRPr sz="1536"/>
             </a:lvl3pPr>
-            <a:lvl4pPr marL="1440180" indent="0">
-              <a:buNone/>
-              <a:defRPr sz="1050"/>
+            <a:lvl4pPr marL="1755785" indent="0">
+              <a:buNone/>
+              <a:defRPr sz="1280"/>
             </a:lvl4pPr>
-            <a:lvl5pPr marL="1920240" indent="0">
-              <a:buNone/>
-              <a:defRPr sz="1050"/>
+            <a:lvl5pPr marL="2341047" indent="0">
+              <a:buNone/>
+              <a:defRPr sz="1280"/>
             </a:lvl5pPr>
-            <a:lvl6pPr marL="2400300" indent="0">
-              <a:buNone/>
-              <a:defRPr sz="1050"/>
+            <a:lvl6pPr marL="2926309" indent="0">
+              <a:buNone/>
+              <a:defRPr sz="1280"/>
             </a:lvl6pPr>
-            <a:lvl7pPr marL="2880360" indent="0">
-              <a:buNone/>
-              <a:defRPr sz="1050"/>
+            <a:lvl7pPr marL="3511570" indent="0">
+              <a:buNone/>
+              <a:defRPr sz="1280"/>
             </a:lvl7pPr>
-            <a:lvl8pPr marL="3360420" indent="0">
-              <a:buNone/>
-              <a:defRPr sz="1050"/>
+            <a:lvl8pPr marL="4096832" indent="0">
+              <a:buNone/>
+              <a:defRPr sz="1280"/>
             </a:lvl8pPr>
-            <a:lvl9pPr marL="3840480" indent="0">
-              <a:buNone/>
-              <a:defRPr sz="1050"/>
+            <a:lvl9pPr marL="4682094" indent="0">
+              <a:buNone/>
+              <a:defRPr sz="1280"/>
             </a:lvl9pPr>
           </a:lstStyle>
           <a:p>
@@ -2355,7 +2353,7 @@
           <a:p>
             <a:fld id="{128B2BB6-DE7B-44D1-BBCC-4DE62C6920C0}" type="datetimeFigureOut">
               <a:rPr lang="en-US" smtClean="0"/>
-              <a:t>2/20/2017</a:t>
+              <a:t>2/28/2017</a:t>
             </a:fld>
             <a:endParaRPr lang="en-US"/>
           </a:p>
@@ -2406,7 +2404,7 @@
     </p:spTree>
     <p:extLst>
       <p:ext uri="{BB962C8B-B14F-4D97-AF65-F5344CB8AC3E}">
-        <p14:creationId xmlns:p14="http://schemas.microsoft.com/office/powerpoint/2010/main" val="1695578208"/>
+        <p14:creationId xmlns:p14="http://schemas.microsoft.com/office/powerpoint/2010/main" val="203835248"/>
       </p:ext>
     </p:extLst>
   </p:cSld>
@@ -2450,8 +2448,8 @@
         </p:nvSpPr>
         <p:spPr>
           <a:xfrm>
-            <a:off x="880110" y="438150"/>
-            <a:ext cx="11041380" cy="1590676"/>
+            <a:off x="911543" y="467396"/>
+            <a:ext cx="11435715" cy="1696843"/>
           </a:xfrm>
           <a:prstGeom prst="rect">
             <a:avLst/>
@@ -2483,8 +2481,8 @@
         </p:nvSpPr>
         <p:spPr>
           <a:xfrm>
-            <a:off x="880110" y="2190750"/>
-            <a:ext cx="11041380" cy="5221606"/>
+            <a:off x="911543" y="2336969"/>
+            <a:ext cx="11435715" cy="5570116"/>
           </a:xfrm>
           <a:prstGeom prst="rect">
             <a:avLst/>
@@ -2545,8 +2543,8 @@
         </p:nvSpPr>
         <p:spPr>
           <a:xfrm>
-            <a:off x="880110" y="7627621"/>
-            <a:ext cx="2880360" cy="438150"/>
+            <a:off x="911543" y="8136718"/>
+            <a:ext cx="2983230" cy="467394"/>
           </a:xfrm>
           <a:prstGeom prst="rect">
             <a:avLst/>
@@ -2556,7 +2554,7 @@
           <a:bodyPr vert="horz" lIns="91440" tIns="45720" rIns="91440" bIns="45720" rtlCol="0" anchor="ctr"/>
           <a:lstStyle>
             <a:lvl1pPr algn="l">
-              <a:defRPr sz="1260">
+              <a:defRPr sz="1536">
                 <a:solidFill>
                   <a:schemeClr val="tx1">
                     <a:tint val="75000"/>
@@ -2568,7 +2566,7 @@
           <a:p>
             <a:fld id="{128B2BB6-DE7B-44D1-BBCC-4DE62C6920C0}" type="datetimeFigureOut">
               <a:rPr lang="en-US" smtClean="0"/>
-              <a:t>2/20/2017</a:t>
+              <a:t>2/28/2017</a:t>
             </a:fld>
             <a:endParaRPr lang="en-US"/>
           </a:p>
@@ -2586,8 +2584,8 @@
         </p:nvSpPr>
         <p:spPr>
           <a:xfrm>
-            <a:off x="4240530" y="7627621"/>
-            <a:ext cx="4320540" cy="438150"/>
+            <a:off x="4391978" y="8136718"/>
+            <a:ext cx="4474845" cy="467394"/>
           </a:xfrm>
           <a:prstGeom prst="rect">
             <a:avLst/>
@@ -2597,7 +2595,7 @@
           <a:bodyPr vert="horz" lIns="91440" tIns="45720" rIns="91440" bIns="45720" rtlCol="0" anchor="ctr"/>
           <a:lstStyle>
             <a:lvl1pPr algn="ctr">
-              <a:defRPr sz="1260">
+              <a:defRPr sz="1536">
                 <a:solidFill>
                   <a:schemeClr val="tx1">
                     <a:tint val="75000"/>
@@ -2623,8 +2621,8 @@
         </p:nvSpPr>
         <p:spPr>
           <a:xfrm>
-            <a:off x="9041130" y="7627621"/>
-            <a:ext cx="2880360" cy="438150"/>
+            <a:off x="9364028" y="8136718"/>
+            <a:ext cx="2983230" cy="467394"/>
           </a:xfrm>
           <a:prstGeom prst="rect">
             <a:avLst/>
@@ -2634,7 +2632,7 @@
           <a:bodyPr vert="horz" lIns="91440" tIns="45720" rIns="91440" bIns="45720" rtlCol="0" anchor="ctr"/>
           <a:lstStyle>
             <a:lvl1pPr algn="r">
-              <a:defRPr sz="1260">
+              <a:defRPr sz="1536">
                 <a:solidFill>
                   <a:schemeClr val="tx1">
                     <a:tint val="75000"/>
@@ -2655,27 +2653,27 @@
     </p:spTree>
     <p:extLst>
       <p:ext uri="{BB962C8B-B14F-4D97-AF65-F5344CB8AC3E}">
-        <p14:creationId xmlns:p14="http://schemas.microsoft.com/office/powerpoint/2010/main" val="2521170410"/>
+        <p14:creationId xmlns:p14="http://schemas.microsoft.com/office/powerpoint/2010/main" val="4274137863"/>
       </p:ext>
     </p:extLst>
   </p:cSld>
   <p:clrMap bg1="lt1" tx1="dk1" bg2="lt2" tx2="dk2" accent1="accent1" accent2="accent2" accent3="accent3" accent4="accent4" accent5="accent5" accent6="accent6" hlink="hlink" folHlink="folHlink"/>
   <p:sldLayoutIdLst>
-    <p:sldLayoutId id="2147483673" r:id="rId1"/>
-    <p:sldLayoutId id="2147483674" r:id="rId2"/>
-    <p:sldLayoutId id="2147483675" r:id="rId3"/>
-    <p:sldLayoutId id="2147483676" r:id="rId4"/>
-    <p:sldLayoutId id="2147483677" r:id="rId5"/>
-    <p:sldLayoutId id="2147483678" r:id="rId6"/>
-    <p:sldLayoutId id="2147483679" r:id="rId7"/>
-    <p:sldLayoutId id="2147483680" r:id="rId8"/>
-    <p:sldLayoutId id="2147483681" r:id="rId9"/>
-    <p:sldLayoutId id="2147483682" r:id="rId10"/>
-    <p:sldLayoutId id="2147483683" r:id="rId11"/>
+    <p:sldLayoutId id="2147483709" r:id="rId1"/>
+    <p:sldLayoutId id="2147483710" r:id="rId2"/>
+    <p:sldLayoutId id="2147483711" r:id="rId3"/>
+    <p:sldLayoutId id="2147483712" r:id="rId4"/>
+    <p:sldLayoutId id="2147483713" r:id="rId5"/>
+    <p:sldLayoutId id="2147483714" r:id="rId6"/>
+    <p:sldLayoutId id="2147483715" r:id="rId7"/>
+    <p:sldLayoutId id="2147483716" r:id="rId8"/>
+    <p:sldLayoutId id="2147483717" r:id="rId9"/>
+    <p:sldLayoutId id="2147483718" r:id="rId10"/>
+    <p:sldLayoutId id="2147483719" r:id="rId11"/>
   </p:sldLayoutIdLst>
   <p:txStyles>
     <p:titleStyle>
-      <a:lvl1pPr algn="l" defTabSz="960120" rtl="0" eaLnBrk="1" latinLnBrk="0" hangingPunct="1">
+      <a:lvl1pPr algn="l" defTabSz="1170523" rtl="0" eaLnBrk="1" latinLnBrk="0" hangingPunct="1">
         <a:lnSpc>
           <a:spcPct val="90000"/>
         </a:lnSpc>
@@ -2683,7 +2681,7 @@
           <a:spcPct val="0"/>
         </a:spcBef>
         <a:buNone/>
-        <a:defRPr sz="4620" kern="1200">
+        <a:defRPr sz="5632" kern="1200">
           <a:solidFill>
             <a:schemeClr val="tx1"/>
           </a:solidFill>
@@ -2694,16 +2692,16 @@
       </a:lvl1pPr>
     </p:titleStyle>
     <p:bodyStyle>
-      <a:lvl1pPr marL="240030" indent="-240030" algn="l" defTabSz="960120" rtl="0" eaLnBrk="1" latinLnBrk="0" hangingPunct="1">
+      <a:lvl1pPr marL="292631" indent="-292631" algn="l" defTabSz="1170523" rtl="0" eaLnBrk="1" latinLnBrk="0" hangingPunct="1">
         <a:lnSpc>
           <a:spcPct val="90000"/>
         </a:lnSpc>
         <a:spcBef>
-          <a:spcPts val="1050"/>
+          <a:spcPts val="1280"/>
         </a:spcBef>
         <a:buFont typeface="Arial" panose="020B0604020202020204" pitchFamily="34" charset="0"/>
         <a:buChar char="•"/>
-        <a:defRPr sz="2940" kern="1200">
+        <a:defRPr sz="3584" kern="1200">
           <a:solidFill>
             <a:schemeClr val="tx1"/>
           </a:solidFill>
@@ -2712,16 +2710,16 @@
           <a:cs typeface="+mn-cs"/>
         </a:defRPr>
       </a:lvl1pPr>
-      <a:lvl2pPr marL="720090" indent="-240030" algn="l" defTabSz="960120" rtl="0" eaLnBrk="1" latinLnBrk="0" hangingPunct="1">
+      <a:lvl2pPr marL="877893" indent="-292631" algn="l" defTabSz="1170523" rtl="0" eaLnBrk="1" latinLnBrk="0" hangingPunct="1">
         <a:lnSpc>
           <a:spcPct val="90000"/>
         </a:lnSpc>
         <a:spcBef>
-          <a:spcPts val="525"/>
+          <a:spcPts val="640"/>
         </a:spcBef>
         <a:buFont typeface="Arial" panose="020B0604020202020204" pitchFamily="34" charset="0"/>
         <a:buChar char="•"/>
-        <a:defRPr sz="2520" kern="1200">
+        <a:defRPr sz="3072" kern="1200">
           <a:solidFill>
             <a:schemeClr val="tx1"/>
           </a:solidFill>
@@ -2730,16 +2728,16 @@
           <a:cs typeface="+mn-cs"/>
         </a:defRPr>
       </a:lvl2pPr>
-      <a:lvl3pPr marL="1200150" indent="-240030" algn="l" defTabSz="960120" rtl="0" eaLnBrk="1" latinLnBrk="0" hangingPunct="1">
+      <a:lvl3pPr marL="1463154" indent="-292631" algn="l" defTabSz="1170523" rtl="0" eaLnBrk="1" latinLnBrk="0" hangingPunct="1">
         <a:lnSpc>
           <a:spcPct val="90000"/>
         </a:lnSpc>
         <a:spcBef>
-          <a:spcPts val="525"/>
+          <a:spcPts val="640"/>
         </a:spcBef>
         <a:buFont typeface="Arial" panose="020B0604020202020204" pitchFamily="34" charset="0"/>
         <a:buChar char="•"/>
-        <a:defRPr sz="2100" kern="1200">
+        <a:defRPr sz="2560" kern="1200">
           <a:solidFill>
             <a:schemeClr val="tx1"/>
           </a:solidFill>
@@ -2748,16 +2746,16 @@
           <a:cs typeface="+mn-cs"/>
         </a:defRPr>
       </a:lvl3pPr>
-      <a:lvl4pPr marL="1680210" indent="-240030" algn="l" defTabSz="960120" rtl="0" eaLnBrk="1" latinLnBrk="0" hangingPunct="1">
+      <a:lvl4pPr marL="2048416" indent="-292631" algn="l" defTabSz="1170523" rtl="0" eaLnBrk="1" latinLnBrk="0" hangingPunct="1">
         <a:lnSpc>
           <a:spcPct val="90000"/>
         </a:lnSpc>
         <a:spcBef>
-          <a:spcPts val="525"/>
+          <a:spcPts val="640"/>
         </a:spcBef>
         <a:buFont typeface="Arial" panose="020B0604020202020204" pitchFamily="34" charset="0"/>
         <a:buChar char="•"/>
-        <a:defRPr sz="1890" kern="1200">
+        <a:defRPr sz="2304" kern="1200">
           <a:solidFill>
             <a:schemeClr val="tx1"/>
           </a:solidFill>
@@ -2766,16 +2764,16 @@
           <a:cs typeface="+mn-cs"/>
         </a:defRPr>
       </a:lvl4pPr>
-      <a:lvl5pPr marL="2160270" indent="-240030" algn="l" defTabSz="960120" rtl="0" eaLnBrk="1" latinLnBrk="0" hangingPunct="1">
+      <a:lvl5pPr marL="2633678" indent="-292631" algn="l" defTabSz="1170523" rtl="0" eaLnBrk="1" latinLnBrk="0" hangingPunct="1">
         <a:lnSpc>
           <a:spcPct val="90000"/>
         </a:lnSpc>
         <a:spcBef>
-          <a:spcPts val="525"/>
+          <a:spcPts val="640"/>
         </a:spcBef>
         <a:buFont typeface="Arial" panose="020B0604020202020204" pitchFamily="34" charset="0"/>
         <a:buChar char="•"/>
-        <a:defRPr sz="1890" kern="1200">
+        <a:defRPr sz="2304" kern="1200">
           <a:solidFill>
             <a:schemeClr val="tx1"/>
           </a:solidFill>
@@ -2784,16 +2782,16 @@
           <a:cs typeface="+mn-cs"/>
         </a:defRPr>
       </a:lvl5pPr>
-      <a:lvl6pPr marL="2640330" indent="-240030" algn="l" defTabSz="960120" rtl="0" eaLnBrk="1" latinLnBrk="0" hangingPunct="1">
+      <a:lvl6pPr marL="3218939" indent="-292631" algn="l" defTabSz="1170523" rtl="0" eaLnBrk="1" latinLnBrk="0" hangingPunct="1">
         <a:lnSpc>
           <a:spcPct val="90000"/>
         </a:lnSpc>
         <a:spcBef>
-          <a:spcPts val="525"/>
+          <a:spcPts val="640"/>
         </a:spcBef>
         <a:buFont typeface="Arial" panose="020B0604020202020204" pitchFamily="34" charset="0"/>
         <a:buChar char="•"/>
-        <a:defRPr sz="1890" kern="1200">
+        <a:defRPr sz="2304" kern="1200">
           <a:solidFill>
             <a:schemeClr val="tx1"/>
           </a:solidFill>
@@ -2802,16 +2800,16 @@
           <a:cs typeface="+mn-cs"/>
         </a:defRPr>
       </a:lvl6pPr>
-      <a:lvl7pPr marL="3120390" indent="-240030" algn="l" defTabSz="960120" rtl="0" eaLnBrk="1" latinLnBrk="0" hangingPunct="1">
+      <a:lvl7pPr marL="3804201" indent="-292631" algn="l" defTabSz="1170523" rtl="0" eaLnBrk="1" latinLnBrk="0" hangingPunct="1">
         <a:lnSpc>
           <a:spcPct val="90000"/>
         </a:lnSpc>
         <a:spcBef>
-          <a:spcPts val="525"/>
+          <a:spcPts val="640"/>
         </a:spcBef>
         <a:buFont typeface="Arial" panose="020B0604020202020204" pitchFamily="34" charset="0"/>
         <a:buChar char="•"/>
-        <a:defRPr sz="1890" kern="1200">
+        <a:defRPr sz="2304" kern="1200">
           <a:solidFill>
             <a:schemeClr val="tx1"/>
           </a:solidFill>
@@ -2820,16 +2818,16 @@
           <a:cs typeface="+mn-cs"/>
         </a:defRPr>
       </a:lvl7pPr>
-      <a:lvl8pPr marL="3600450" indent="-240030" algn="l" defTabSz="960120" rtl="0" eaLnBrk="1" latinLnBrk="0" hangingPunct="1">
+      <a:lvl8pPr marL="4389463" indent="-292631" algn="l" defTabSz="1170523" rtl="0" eaLnBrk="1" latinLnBrk="0" hangingPunct="1">
         <a:lnSpc>
           <a:spcPct val="90000"/>
         </a:lnSpc>
         <a:spcBef>
-          <a:spcPts val="525"/>
+          <a:spcPts val="640"/>
         </a:spcBef>
         <a:buFont typeface="Arial" panose="020B0604020202020204" pitchFamily="34" charset="0"/>
         <a:buChar char="•"/>
-        <a:defRPr sz="1890" kern="1200">
+        <a:defRPr sz="2304" kern="1200">
           <a:solidFill>
             <a:schemeClr val="tx1"/>
           </a:solidFill>
@@ -2838,16 +2836,16 @@
           <a:cs typeface="+mn-cs"/>
         </a:defRPr>
       </a:lvl8pPr>
-      <a:lvl9pPr marL="4080510" indent="-240030" algn="l" defTabSz="960120" rtl="0" eaLnBrk="1" latinLnBrk="0" hangingPunct="1">
+      <a:lvl9pPr marL="4974725" indent="-292631" algn="l" defTabSz="1170523" rtl="0" eaLnBrk="1" latinLnBrk="0" hangingPunct="1">
         <a:lnSpc>
           <a:spcPct val="90000"/>
         </a:lnSpc>
         <a:spcBef>
-          <a:spcPts val="525"/>
+          <a:spcPts val="640"/>
         </a:spcBef>
         <a:buFont typeface="Arial" panose="020B0604020202020204" pitchFamily="34" charset="0"/>
         <a:buChar char="•"/>
-        <a:defRPr sz="1890" kern="1200">
+        <a:defRPr sz="2304" kern="1200">
           <a:solidFill>
             <a:schemeClr val="tx1"/>
           </a:solidFill>
@@ -2861,8 +2859,8 @@
       <a:defPPr>
         <a:defRPr lang="en-US"/>
       </a:defPPr>
-      <a:lvl1pPr marL="0" algn="l" defTabSz="960120" rtl="0" eaLnBrk="1" latinLnBrk="0" hangingPunct="1">
-        <a:defRPr sz="1890" kern="1200">
+      <a:lvl1pPr marL="0" algn="l" defTabSz="1170523" rtl="0" eaLnBrk="1" latinLnBrk="0" hangingPunct="1">
+        <a:defRPr sz="2304" kern="1200">
           <a:solidFill>
             <a:schemeClr val="tx1"/>
           </a:solidFill>
@@ -2871,8 +2869,8 @@
           <a:cs typeface="+mn-cs"/>
         </a:defRPr>
       </a:lvl1pPr>
-      <a:lvl2pPr marL="480060" algn="l" defTabSz="960120" rtl="0" eaLnBrk="1" latinLnBrk="0" hangingPunct="1">
-        <a:defRPr sz="1890" kern="1200">
+      <a:lvl2pPr marL="585262" algn="l" defTabSz="1170523" rtl="0" eaLnBrk="1" latinLnBrk="0" hangingPunct="1">
+        <a:defRPr sz="2304" kern="1200">
           <a:solidFill>
             <a:schemeClr val="tx1"/>
           </a:solidFill>
@@ -2881,8 +2879,8 @@
           <a:cs typeface="+mn-cs"/>
         </a:defRPr>
       </a:lvl2pPr>
-      <a:lvl3pPr marL="960120" algn="l" defTabSz="960120" rtl="0" eaLnBrk="1" latinLnBrk="0" hangingPunct="1">
-        <a:defRPr sz="1890" kern="1200">
+      <a:lvl3pPr marL="1170523" algn="l" defTabSz="1170523" rtl="0" eaLnBrk="1" latinLnBrk="0" hangingPunct="1">
+        <a:defRPr sz="2304" kern="1200">
           <a:solidFill>
             <a:schemeClr val="tx1"/>
           </a:solidFill>
@@ -2891,8 +2889,8 @@
           <a:cs typeface="+mn-cs"/>
         </a:defRPr>
       </a:lvl3pPr>
-      <a:lvl4pPr marL="1440180" algn="l" defTabSz="960120" rtl="0" eaLnBrk="1" latinLnBrk="0" hangingPunct="1">
-        <a:defRPr sz="1890" kern="1200">
+      <a:lvl4pPr marL="1755785" algn="l" defTabSz="1170523" rtl="0" eaLnBrk="1" latinLnBrk="0" hangingPunct="1">
+        <a:defRPr sz="2304" kern="1200">
           <a:solidFill>
             <a:schemeClr val="tx1"/>
           </a:solidFill>
@@ -2901,8 +2899,8 @@
           <a:cs typeface="+mn-cs"/>
         </a:defRPr>
       </a:lvl4pPr>
-      <a:lvl5pPr marL="1920240" algn="l" defTabSz="960120" rtl="0" eaLnBrk="1" latinLnBrk="0" hangingPunct="1">
-        <a:defRPr sz="1890" kern="1200">
+      <a:lvl5pPr marL="2341047" algn="l" defTabSz="1170523" rtl="0" eaLnBrk="1" latinLnBrk="0" hangingPunct="1">
+        <a:defRPr sz="2304" kern="1200">
           <a:solidFill>
             <a:schemeClr val="tx1"/>
           </a:solidFill>
@@ -2911,8 +2909,8 @@
           <a:cs typeface="+mn-cs"/>
         </a:defRPr>
       </a:lvl5pPr>
-      <a:lvl6pPr marL="2400300" algn="l" defTabSz="960120" rtl="0" eaLnBrk="1" latinLnBrk="0" hangingPunct="1">
-        <a:defRPr sz="1890" kern="1200">
+      <a:lvl6pPr marL="2926309" algn="l" defTabSz="1170523" rtl="0" eaLnBrk="1" latinLnBrk="0" hangingPunct="1">
+        <a:defRPr sz="2304" kern="1200">
           <a:solidFill>
             <a:schemeClr val="tx1"/>
           </a:solidFill>
@@ -2921,8 +2919,8 @@
           <a:cs typeface="+mn-cs"/>
         </a:defRPr>
       </a:lvl6pPr>
-      <a:lvl7pPr marL="2880360" algn="l" defTabSz="960120" rtl="0" eaLnBrk="1" latinLnBrk="0" hangingPunct="1">
-        <a:defRPr sz="1890" kern="1200">
+      <a:lvl7pPr marL="3511570" algn="l" defTabSz="1170523" rtl="0" eaLnBrk="1" latinLnBrk="0" hangingPunct="1">
+        <a:defRPr sz="2304" kern="1200">
           <a:solidFill>
             <a:schemeClr val="tx1"/>
           </a:solidFill>
@@ -2931,8 +2929,8 @@
           <a:cs typeface="+mn-cs"/>
         </a:defRPr>
       </a:lvl7pPr>
-      <a:lvl8pPr marL="3360420" algn="l" defTabSz="960120" rtl="0" eaLnBrk="1" latinLnBrk="0" hangingPunct="1">
-        <a:defRPr sz="1890" kern="1200">
+      <a:lvl8pPr marL="4096832" algn="l" defTabSz="1170523" rtl="0" eaLnBrk="1" latinLnBrk="0" hangingPunct="1">
+        <a:defRPr sz="2304" kern="1200">
           <a:solidFill>
             <a:schemeClr val="tx1"/>
           </a:solidFill>
@@ -2941,8 +2939,8 @@
           <a:cs typeface="+mn-cs"/>
         </a:defRPr>
       </a:lvl8pPr>
-      <a:lvl9pPr marL="3840480" algn="l" defTabSz="960120" rtl="0" eaLnBrk="1" latinLnBrk="0" hangingPunct="1">
-        <a:defRPr sz="1890" kern="1200">
+      <a:lvl9pPr marL="4682094" algn="l" defTabSz="1170523" rtl="0" eaLnBrk="1" latinLnBrk="0" hangingPunct="1">
+        <a:defRPr sz="2304" kern="1200">
           <a:solidFill>
             <a:schemeClr val="tx1"/>
           </a:solidFill>
@@ -3007,13 +3005,13 @@
           <a:bodyPr/>
           <a:lstStyle/>
           <a:p>
-            <a:endParaRPr lang="en-US"/>
+            <a:endParaRPr lang="en-US" dirty="0"/>
           </a:p>
         </p:txBody>
       </p:sp>
       <p:pic>
         <p:nvPicPr>
-          <p:cNvPr id="7" name="Picture 6"/>
+          <p:cNvPr id="5" name="Picture 4"/>
           <p:cNvPicPr>
             <a:picLocks noChangeAspect="1"/>
           </p:cNvPicPr>
@@ -3021,13 +3019,13 @@
         </p:nvPicPr>
         <p:blipFill rotWithShape="1">
           <a:blip r:embed="rId2"/>
-          <a:srcRect l="13083" t="12963" r="15000" b="6000"/>
+          <a:srcRect l="13083" t="11874" r="17500" b="5559"/>
           <a:stretch/>
         </p:blipFill>
         <p:spPr>
           <a:xfrm>
-            <a:off x="0" y="0"/>
-            <a:ext cx="13152120" cy="8336280"/>
+            <a:off x="281940" y="132115"/>
+            <a:ext cx="12694920" cy="8493725"/>
           </a:xfrm>
           <a:prstGeom prst="rect">
             <a:avLst/>

</xml_diff>